<commit_message>
For Workshop 103, lab1, changed R1 to be 3.2k instead of 10k (10k didn't provide enough current).  Also added AN1707 to Workshop 102
</commit_message>
<xml_diff>
--- a/100 - Analog Electronics Fundamentals/Analog Electronics Fundamentals 103.pptx
+++ b/100 - Analog Electronics Fundamentals/Analog Electronics Fundamentals 103.pptx
@@ -305,7 +305,7 @@
             <a:fld id="{29A1C4C6-CF9E-4C57-810C-C8B73CF99206}" type="datetimeFigureOut">
               <a:rPr lang="en-CA" smtClean="0"/>
               <a:pPr/>
-              <a:t>11/06/2012</a:t>
+              <a:t>13/06/2012</a:t>
             </a:fld>
             <a:endParaRPr lang="en-CA"/>
           </a:p>
@@ -472,7 +472,7 @@
             <a:fld id="{29A1C4C6-CF9E-4C57-810C-C8B73CF99206}" type="datetimeFigureOut">
               <a:rPr lang="en-CA" smtClean="0"/>
               <a:pPr/>
-              <a:t>11/06/2012</a:t>
+              <a:t>13/06/2012</a:t>
             </a:fld>
             <a:endParaRPr lang="en-CA"/>
           </a:p>
@@ -649,7 +649,7 @@
             <a:fld id="{29A1C4C6-CF9E-4C57-810C-C8B73CF99206}" type="datetimeFigureOut">
               <a:rPr lang="en-CA" smtClean="0"/>
               <a:pPr/>
-              <a:t>11/06/2012</a:t>
+              <a:t>13/06/2012</a:t>
             </a:fld>
             <a:endParaRPr lang="en-CA"/>
           </a:p>
@@ -816,7 +816,7 @@
             <a:fld id="{29A1C4C6-CF9E-4C57-810C-C8B73CF99206}" type="datetimeFigureOut">
               <a:rPr lang="en-CA" smtClean="0"/>
               <a:pPr/>
-              <a:t>11/06/2012</a:t>
+              <a:t>13/06/2012</a:t>
             </a:fld>
             <a:endParaRPr lang="en-CA"/>
           </a:p>
@@ -1059,7 +1059,7 @@
             <a:fld id="{29A1C4C6-CF9E-4C57-810C-C8B73CF99206}" type="datetimeFigureOut">
               <a:rPr lang="en-CA" smtClean="0"/>
               <a:pPr/>
-              <a:t>11/06/2012</a:t>
+              <a:t>13/06/2012</a:t>
             </a:fld>
             <a:endParaRPr lang="en-CA"/>
           </a:p>
@@ -1344,7 +1344,7 @@
             <a:fld id="{29A1C4C6-CF9E-4C57-810C-C8B73CF99206}" type="datetimeFigureOut">
               <a:rPr lang="en-CA" smtClean="0"/>
               <a:pPr/>
-              <a:t>11/06/2012</a:t>
+              <a:t>13/06/2012</a:t>
             </a:fld>
             <a:endParaRPr lang="en-CA"/>
           </a:p>
@@ -1763,7 +1763,7 @@
             <a:fld id="{29A1C4C6-CF9E-4C57-810C-C8B73CF99206}" type="datetimeFigureOut">
               <a:rPr lang="en-CA" smtClean="0"/>
               <a:pPr/>
-              <a:t>11/06/2012</a:t>
+              <a:t>13/06/2012</a:t>
             </a:fld>
             <a:endParaRPr lang="en-CA"/>
           </a:p>
@@ -1878,7 +1878,7 @@
             <a:fld id="{29A1C4C6-CF9E-4C57-810C-C8B73CF99206}" type="datetimeFigureOut">
               <a:rPr lang="en-CA" smtClean="0"/>
               <a:pPr/>
-              <a:t>11/06/2012</a:t>
+              <a:t>13/06/2012</a:t>
             </a:fld>
             <a:endParaRPr lang="en-CA"/>
           </a:p>
@@ -1970,7 +1970,7 @@
             <a:fld id="{29A1C4C6-CF9E-4C57-810C-C8B73CF99206}" type="datetimeFigureOut">
               <a:rPr lang="en-CA" smtClean="0"/>
               <a:pPr/>
-              <a:t>11/06/2012</a:t>
+              <a:t>13/06/2012</a:t>
             </a:fld>
             <a:endParaRPr lang="en-CA"/>
           </a:p>
@@ -2244,7 +2244,7 @@
             <a:fld id="{29A1C4C6-CF9E-4C57-810C-C8B73CF99206}" type="datetimeFigureOut">
               <a:rPr lang="en-CA" smtClean="0"/>
               <a:pPr/>
-              <a:t>11/06/2012</a:t>
+              <a:t>13/06/2012</a:t>
             </a:fld>
             <a:endParaRPr lang="en-CA"/>
           </a:p>
@@ -2494,7 +2494,7 @@
             <a:fld id="{29A1C4C6-CF9E-4C57-810C-C8B73CF99206}" type="datetimeFigureOut">
               <a:rPr lang="en-CA" smtClean="0"/>
               <a:pPr/>
-              <a:t>11/06/2012</a:t>
+              <a:t>13/06/2012</a:t>
             </a:fld>
             <a:endParaRPr lang="en-CA"/>
           </a:p>
@@ -2704,7 +2704,7 @@
             <a:fld id="{29A1C4C6-CF9E-4C57-810C-C8B73CF99206}" type="datetimeFigureOut">
               <a:rPr lang="en-CA" smtClean="0"/>
               <a:pPr/>
-              <a:t>11/06/2012</a:t>
+              <a:t>13/06/2012</a:t>
             </a:fld>
             <a:endParaRPr lang="en-CA"/>
           </a:p>
@@ -3227,18 +3227,7 @@
                   </a:schemeClr>
                 </a:solidFill>
               </a:rPr>
-              <a:t>-Demonstration: Variable </a:t>
-            </a:r>
-            <a:r>
-              <a:rPr lang="en-CA" dirty="0" smtClean="0">
-                <a:solidFill>
-                  <a:schemeClr val="tx1">
-                    <a:lumMod val="75000"/>
-                    <a:lumOff val="25000"/>
-                  </a:schemeClr>
-                </a:solidFill>
-              </a:rPr>
-              <a:t>Bench </a:t>
+              <a:t>-Demonstration: Variable Bench </a:t>
             </a:r>
             <a:r>
               <a:rPr lang="en-CA" dirty="0" err="1" smtClean="0">
@@ -3293,8 +3282,11 @@
                   </a:schemeClr>
                 </a:solidFill>
               </a:rPr>
-              <a:t>-Lab1: Basic Transistor </a:t>
-            </a:r>
+              <a:t>-Lab1: Basic Transistor Amplifier</a:t>
+            </a:r>
+          </a:p>
+          <a:p>
+            <a:pPr algn="l"/>
             <a:r>
               <a:rPr lang="en-CA" dirty="0" smtClean="0">
                 <a:solidFill>
@@ -3304,11 +3296,19 @@
                   </a:schemeClr>
                 </a:solidFill>
               </a:rPr>
-              <a:t>Amplifier</a:t>
-            </a:r>
-          </a:p>
-          <a:p>
-            <a:pPr algn="l"/>
+              <a:t>-Lab2: 555 One Shot (</a:t>
+            </a:r>
+            <a:r>
+              <a:rPr lang="en-CA" dirty="0" err="1" smtClean="0">
+                <a:solidFill>
+                  <a:schemeClr val="tx1">
+                    <a:lumMod val="75000"/>
+                    <a:lumOff val="25000"/>
+                  </a:schemeClr>
+                </a:solidFill>
+              </a:rPr>
+              <a:t>Monostable</a:t>
+            </a:r>
             <a:r>
               <a:rPr lang="en-CA" dirty="0" smtClean="0">
                 <a:solidFill>
@@ -3318,7 +3318,21 @@
                   </a:schemeClr>
                 </a:solidFill>
               </a:rPr>
-              <a:t>-Lab2: 555 One Shot (</a:t>
+              <a:t> Configuration)</a:t>
+            </a:r>
+          </a:p>
+          <a:p>
+            <a:pPr algn="l"/>
+            <a:r>
+              <a:rPr lang="en-CA" dirty="0" smtClean="0">
+                <a:solidFill>
+                  <a:schemeClr val="tx1">
+                    <a:lumMod val="75000"/>
+                    <a:lumOff val="25000"/>
+                  </a:schemeClr>
+                </a:solidFill>
+              </a:rPr>
+              <a:t>-Lab3: 555 LED Flasher (</a:t>
             </a:r>
             <a:r>
               <a:rPr lang="en-CA" dirty="0" err="1" smtClean="0">
@@ -3329,7 +3343,7 @@
                   </a:schemeClr>
                 </a:solidFill>
               </a:rPr>
-              <a:t>Monostable</a:t>
+              <a:t>Astable</a:t>
             </a:r>
             <a:r>
               <a:rPr lang="en-CA" dirty="0" smtClean="0">
@@ -3340,19 +3354,19 @@
                   </a:schemeClr>
                 </a:solidFill>
               </a:rPr>
-              <a:t> Configuration)</a:t>
-            </a:r>
-            <a:endParaRPr lang="en-CA" dirty="0" smtClean="0">
-              <a:solidFill>
-                <a:schemeClr val="tx1">
-                  <a:lumMod val="75000"/>
-                  <a:lumOff val="25000"/>
-                </a:schemeClr>
-              </a:solidFill>
-            </a:endParaRPr>
-          </a:p>
-          <a:p>
-            <a:pPr algn="l"/>
+              <a:t> </a:t>
+            </a:r>
+            <a:r>
+              <a:rPr lang="en-CA" dirty="0" err="1" smtClean="0">
+                <a:solidFill>
+                  <a:schemeClr val="tx1">
+                    <a:lumMod val="75000"/>
+                    <a:lumOff val="25000"/>
+                  </a:schemeClr>
+                </a:solidFill>
+              </a:rPr>
+              <a:t>Multivibrator</a:t>
+            </a:r>
             <a:r>
               <a:rPr lang="en-CA" dirty="0" smtClean="0">
                 <a:solidFill>
@@ -3362,8 +3376,11 @@
                   </a:schemeClr>
                 </a:solidFill>
               </a:rPr>
-              <a:t>-</a:t>
-            </a:r>
+              <a:t>)</a:t>
+            </a:r>
+          </a:p>
+          <a:p>
+            <a:pPr algn="l"/>
             <a:r>
               <a:rPr lang="en-CA" dirty="0" smtClean="0">
                 <a:solidFill>
@@ -3373,128 +3390,7 @@
                   </a:schemeClr>
                 </a:solidFill>
               </a:rPr>
-              <a:t>Lab3: </a:t>
-            </a:r>
-            <a:r>
-              <a:rPr lang="en-CA" dirty="0" smtClean="0">
-                <a:solidFill>
-                  <a:schemeClr val="tx1">
-                    <a:lumMod val="75000"/>
-                    <a:lumOff val="25000"/>
-                  </a:schemeClr>
-                </a:solidFill>
-              </a:rPr>
-              <a:t>555 LED </a:t>
-            </a:r>
-            <a:r>
-              <a:rPr lang="en-CA" dirty="0" smtClean="0">
-                <a:solidFill>
-                  <a:schemeClr val="tx1">
-                    <a:lumMod val="75000"/>
-                    <a:lumOff val="25000"/>
-                  </a:schemeClr>
-                </a:solidFill>
-              </a:rPr>
-              <a:t>Flasher (</a:t>
-            </a:r>
-            <a:r>
-              <a:rPr lang="en-CA" dirty="0" err="1" smtClean="0">
-                <a:solidFill>
-                  <a:schemeClr val="tx1">
-                    <a:lumMod val="75000"/>
-                    <a:lumOff val="25000"/>
-                  </a:schemeClr>
-                </a:solidFill>
-              </a:rPr>
-              <a:t>Astable</a:t>
-            </a:r>
-            <a:r>
-              <a:rPr lang="en-CA" dirty="0" smtClean="0">
-                <a:solidFill>
-                  <a:schemeClr val="tx1">
-                    <a:lumMod val="75000"/>
-                    <a:lumOff val="25000"/>
-                  </a:schemeClr>
-                </a:solidFill>
-              </a:rPr>
-              <a:t> </a:t>
-            </a:r>
-            <a:r>
-              <a:rPr lang="en-CA" dirty="0" err="1" smtClean="0">
-                <a:solidFill>
-                  <a:schemeClr val="tx1">
-                    <a:lumMod val="75000"/>
-                    <a:lumOff val="25000"/>
-                  </a:schemeClr>
-                </a:solidFill>
-              </a:rPr>
-              <a:t>Multivibrator</a:t>
-            </a:r>
-            <a:r>
-              <a:rPr lang="en-CA" dirty="0" smtClean="0">
-                <a:solidFill>
-                  <a:schemeClr val="tx1">
-                    <a:lumMod val="75000"/>
-                    <a:lumOff val="25000"/>
-                  </a:schemeClr>
-                </a:solidFill>
-              </a:rPr>
-              <a:t>)</a:t>
-            </a:r>
-            <a:endParaRPr lang="en-CA" dirty="0" smtClean="0">
-              <a:solidFill>
-                <a:schemeClr val="tx1">
-                  <a:lumMod val="75000"/>
-                  <a:lumOff val="25000"/>
-                </a:schemeClr>
-              </a:solidFill>
-            </a:endParaRPr>
-          </a:p>
-          <a:p>
-            <a:pPr algn="l"/>
-            <a:r>
-              <a:rPr lang="en-CA" dirty="0" smtClean="0">
-                <a:solidFill>
-                  <a:schemeClr val="tx1">
-                    <a:lumMod val="75000"/>
-                    <a:lumOff val="25000"/>
-                  </a:schemeClr>
-                </a:solidFill>
-              </a:rPr>
-              <a:t>-</a:t>
-            </a:r>
-            <a:r>
-              <a:rPr lang="en-CA" dirty="0" smtClean="0">
-                <a:solidFill>
-                  <a:schemeClr val="tx1">
-                    <a:lumMod val="75000"/>
-                    <a:lumOff val="25000"/>
-                  </a:schemeClr>
-                </a:solidFill>
-              </a:rPr>
-              <a:t>Lab4: </a:t>
-            </a:r>
-            <a:r>
-              <a:rPr lang="en-CA" dirty="0" smtClean="0">
-                <a:solidFill>
-                  <a:schemeClr val="tx1">
-                    <a:lumMod val="75000"/>
-                    <a:lumOff val="25000"/>
-                  </a:schemeClr>
-                </a:solidFill>
-              </a:rPr>
-              <a:t>555 Timer </a:t>
-            </a:r>
-            <a:r>
-              <a:rPr lang="en-CA" dirty="0" smtClean="0">
-                <a:solidFill>
-                  <a:schemeClr val="tx1">
-                    <a:lumMod val="75000"/>
-                    <a:lumOff val="25000"/>
-                  </a:schemeClr>
-                </a:solidFill>
-              </a:rPr>
-              <a:t>Buzzer</a:t>
+              <a:t>-Lab4: 555 Timer Buzzer</a:t>
             </a:r>
           </a:p>
           <a:p>
@@ -3623,11 +3519,7 @@
             <a:pPr algn="l"/>
             <a:r>
               <a:rPr lang="en-CA" dirty="0" smtClean="0"/>
-              <a:t>4.1</a:t>
-            </a:r>
-            <a:r>
-              <a:rPr lang="en-CA" dirty="0" smtClean="0"/>
-              <a:t>	 </a:t>
+              <a:t>4.1	 </a:t>
             </a:r>
             <a:r>
               <a:rPr lang="en-CA" dirty="0" smtClean="0">
@@ -3960,11 +3852,7 @@
             <a:pPr algn="l"/>
             <a:r>
               <a:rPr lang="en-CA" dirty="0" smtClean="0"/>
-              <a:t>4.2</a:t>
-            </a:r>
-            <a:r>
-              <a:rPr lang="en-CA" dirty="0" smtClean="0"/>
-              <a:t>	 </a:t>
+              <a:t>4.2	 </a:t>
             </a:r>
             <a:r>
               <a:rPr lang="en-CA" dirty="0" smtClean="0">
@@ -4267,11 +4155,7 @@
             <a:pPr algn="l"/>
             <a:r>
               <a:rPr lang="en-CA" dirty="0" smtClean="0"/>
-              <a:t>4.3</a:t>
-            </a:r>
-            <a:r>
-              <a:rPr lang="en-CA" dirty="0" smtClean="0"/>
-              <a:t>	 </a:t>
+              <a:t>4.3	 </a:t>
             </a:r>
             <a:r>
               <a:rPr lang="en-CA" dirty="0" smtClean="0">
@@ -4507,11 +4391,7 @@
             <a:pPr algn="l"/>
             <a:r>
               <a:rPr lang="en-CA" dirty="0" smtClean="0"/>
-              <a:t>5</a:t>
-            </a:r>
-            <a:r>
-              <a:rPr lang="en-CA" dirty="0" smtClean="0"/>
-              <a:t>	 </a:t>
+              <a:t>5	 </a:t>
             </a:r>
             <a:r>
               <a:rPr lang="en-CA" dirty="0" smtClean="0">
@@ -4557,9 +4437,6 @@
               </a:rPr>
               <a:t>-</a:t>
             </a:r>
-            <a:endParaRPr lang="en-CA" sz="1400" dirty="0" smtClean="0">
-              <a:cs typeface="Andalus" pitchFamily="18" charset="-78"/>
-            </a:endParaRPr>
           </a:p>
         </p:txBody>
       </p:sp>
@@ -4617,7 +4494,7 @@
       </p:pic>
       <p:pic>
         <p:nvPicPr>
-          <p:cNvPr id="11" name="Picture 10" descr="lab1.PNG"/>
+          <p:cNvPr id="7" name="Picture 6" descr="Capture.PNG"/>
           <p:cNvPicPr>
             <a:picLocks noChangeAspect="1"/>
           </p:cNvPicPr>
@@ -4631,8 +4508,8 @@
         </p:blipFill>
         <p:spPr>
           <a:xfrm>
-            <a:off x="1475656" y="742075"/>
-            <a:ext cx="6392225" cy="6115925"/>
+            <a:off x="1331640" y="929370"/>
+            <a:ext cx="6650447" cy="5928630"/>
           </a:xfrm>
           <a:prstGeom prst="rect">
             <a:avLst/>
@@ -4689,15 +4566,7 @@
             <a:pPr algn="l"/>
             <a:r>
               <a:rPr lang="en-CA" dirty="0" smtClean="0"/>
-              <a:t>6</a:t>
-            </a:r>
-            <a:r>
-              <a:rPr lang="en-CA" dirty="0" smtClean="0"/>
-              <a:t>	 </a:t>
-            </a:r>
-            <a:r>
-              <a:rPr lang="en-CA" dirty="0" smtClean="0"/>
-              <a:t>Lab2: </a:t>
+              <a:t>6	 Lab2: </a:t>
             </a:r>
             <a:r>
               <a:rPr lang="en-CA" dirty="0" smtClean="0">
@@ -4708,7 +4577,18 @@
                   </a:schemeClr>
                 </a:solidFill>
               </a:rPr>
-              <a:t>555 </a:t>
+              <a:t>555 One Shot (</a:t>
+            </a:r>
+            <a:r>
+              <a:rPr lang="en-CA" dirty="0" err="1" smtClean="0">
+                <a:solidFill>
+                  <a:schemeClr val="tx1">
+                    <a:lumMod val="75000"/>
+                    <a:lumOff val="25000"/>
+                  </a:schemeClr>
+                </a:solidFill>
+              </a:rPr>
+              <a:t>Monostable</a:t>
             </a:r>
             <a:r>
               <a:rPr lang="en-CA" dirty="0" smtClean="0">
@@ -4719,28 +4599,6 @@
                   </a:schemeClr>
                 </a:solidFill>
               </a:rPr>
-              <a:t>One Shot (</a:t>
-            </a:r>
-            <a:r>
-              <a:rPr lang="en-CA" dirty="0" err="1" smtClean="0">
-                <a:solidFill>
-                  <a:schemeClr val="tx1">
-                    <a:lumMod val="75000"/>
-                    <a:lumOff val="25000"/>
-                  </a:schemeClr>
-                </a:solidFill>
-              </a:rPr>
-              <a:t>Monostable</a:t>
-            </a:r>
-            <a:r>
-              <a:rPr lang="en-CA" dirty="0" smtClean="0">
-                <a:solidFill>
-                  <a:schemeClr val="tx1">
-                    <a:lumMod val="75000"/>
-                    <a:lumOff val="25000"/>
-                  </a:schemeClr>
-                </a:solidFill>
-              </a:rPr>
               <a:t>)</a:t>
             </a:r>
             <a:endParaRPr lang="en-CA" u="sng" dirty="0"/>
@@ -4860,9 +4718,6 @@
               </a:rPr>
               <a:t>.</a:t>
             </a:r>
-            <a:endParaRPr lang="en-CA" sz="1400" dirty="0" smtClean="0">
-              <a:cs typeface="Andalus" pitchFamily="18" charset="-78"/>
-            </a:endParaRPr>
           </a:p>
         </p:txBody>
       </p:sp>
@@ -4992,15 +4847,7 @@
             <a:pPr algn="l"/>
             <a:r>
               <a:rPr lang="en-CA" dirty="0" smtClean="0"/>
-              <a:t>7</a:t>
-            </a:r>
-            <a:r>
-              <a:rPr lang="en-CA" dirty="0" smtClean="0"/>
-              <a:t>	 </a:t>
-            </a:r>
-            <a:r>
-              <a:rPr lang="en-CA" dirty="0" smtClean="0"/>
-              <a:t>Lab3: </a:t>
+              <a:t>7	 Lab3: </a:t>
             </a:r>
             <a:r>
               <a:rPr lang="en-CA" dirty="0" smtClean="0">
@@ -5129,13 +4976,7 @@
               <a:rPr lang="en-CA" sz="1400" b="1" dirty="0" smtClean="0">
                 <a:cs typeface="Andalus" pitchFamily="18" charset="-78"/>
               </a:rPr>
-              <a:t>Frequency (f) = </a:t>
-            </a:r>
-            <a:r>
-              <a:rPr lang="en-CA" sz="1400" b="1" dirty="0" smtClean="0">
-                <a:cs typeface="Andalus" pitchFamily="18" charset="-78"/>
-              </a:rPr>
-              <a:t>1/t</a:t>
+              <a:t>Frequency (f) = 1/t</a:t>
             </a:r>
           </a:p>
           <a:p>
@@ -5344,15 +5185,7 @@
             <a:pPr algn="l"/>
             <a:r>
               <a:rPr lang="en-CA" dirty="0" smtClean="0"/>
-              <a:t>8</a:t>
-            </a:r>
-            <a:r>
-              <a:rPr lang="en-CA" dirty="0" smtClean="0"/>
-              <a:t>	 </a:t>
-            </a:r>
-            <a:r>
-              <a:rPr lang="en-CA" dirty="0" smtClean="0"/>
-              <a:t>Lab4: </a:t>
+              <a:t>8	 Lab4: </a:t>
             </a:r>
             <a:r>
               <a:rPr lang="en-CA" dirty="0" smtClean="0">
@@ -5459,13 +5292,7 @@
               <a:rPr lang="en-CA" sz="1400" b="1" dirty="0" smtClean="0">
                 <a:cs typeface="Andalus" pitchFamily="18" charset="-78"/>
               </a:rPr>
-              <a:t>Frequency (f) = </a:t>
-            </a:r>
-            <a:r>
-              <a:rPr lang="en-CA" sz="1400" b="1" dirty="0" smtClean="0">
-                <a:cs typeface="Andalus" pitchFamily="18" charset="-78"/>
-              </a:rPr>
-              <a:t>1/t</a:t>
+              <a:t>Frequency (f) = 1/t</a:t>
             </a:r>
           </a:p>
           <a:p>
@@ -5674,11 +5501,7 @@
             <a:pPr algn="l"/>
             <a:r>
               <a:rPr lang="en-CA" dirty="0" smtClean="0"/>
-              <a:t>9</a:t>
-            </a:r>
-            <a:r>
-              <a:rPr lang="en-CA" dirty="0" smtClean="0"/>
-              <a:t>	 </a:t>
+              <a:t>9	 </a:t>
             </a:r>
             <a:r>
               <a:rPr lang="en-CA" dirty="0" smtClean="0">
@@ -5689,7 +5512,18 @@
                   </a:schemeClr>
                 </a:solidFill>
               </a:rPr>
-              <a:t>Lab5: </a:t>
+              <a:t>Lab5: Variable </a:t>
+            </a:r>
+            <a:r>
+              <a:rPr lang="en-CA" dirty="0" err="1" smtClean="0">
+                <a:solidFill>
+                  <a:schemeClr val="tx1">
+                    <a:lumMod val="75000"/>
+                    <a:lumOff val="25000"/>
+                  </a:schemeClr>
+                </a:solidFill>
+              </a:rPr>
+              <a:t>powersupply</a:t>
             </a:r>
             <a:r>
               <a:rPr lang="en-CA" dirty="0" smtClean="0">
@@ -5700,28 +5534,6 @@
                   </a:schemeClr>
                 </a:solidFill>
               </a:rPr>
-              <a:t>Variable </a:t>
-            </a:r>
-            <a:r>
-              <a:rPr lang="en-CA" dirty="0" err="1" smtClean="0">
-                <a:solidFill>
-                  <a:schemeClr val="tx1">
-                    <a:lumMod val="75000"/>
-                    <a:lumOff val="25000"/>
-                  </a:schemeClr>
-                </a:solidFill>
-              </a:rPr>
-              <a:t>powersupply</a:t>
-            </a:r>
-            <a:r>
-              <a:rPr lang="en-CA" dirty="0" smtClean="0">
-                <a:solidFill>
-                  <a:schemeClr val="tx1">
-                    <a:lumMod val="75000"/>
-                    <a:lumOff val="25000"/>
-                  </a:schemeClr>
-                </a:solidFill>
-              </a:rPr>
               <a:t> 3v~5v</a:t>
             </a:r>
             <a:endParaRPr lang="en-CA" u="sng" dirty="0"/>
@@ -5755,8 +5567,17 @@
               <a:rPr lang="en-CA" sz="1400" dirty="0" smtClean="0">
                 <a:cs typeface="Andalus" pitchFamily="18" charset="-78"/>
               </a:rPr>
-              <a:t>Use schematic provided with the LM317 datasheet</a:t>
-            </a:r>
+              <a:t>Use schematic provided with the LM317 </a:t>
+            </a:r>
+            <a:r>
+              <a:rPr lang="en-CA" sz="1400" dirty="0" smtClean="0">
+                <a:cs typeface="Andalus" pitchFamily="18" charset="-78"/>
+              </a:rPr>
+              <a:t>datasheet.</a:t>
+            </a:r>
+            <a:endParaRPr lang="en-CA" sz="1400" dirty="0" smtClean="0">
+              <a:cs typeface="Andalus" pitchFamily="18" charset="-78"/>
+            </a:endParaRPr>
           </a:p>
           <a:p>
             <a:pPr algn="just"/>
@@ -5987,11 +5808,7 @@
             </a:r>
             <a:r>
               <a:rPr lang="en-CA" sz="1400" dirty="0" smtClean="0"/>
-              <a:t> voltage</a:t>
-            </a:r>
-            <a:r>
-              <a:rPr lang="en-CA" sz="1400" dirty="0" smtClean="0"/>
-              <a:t>.“</a:t>
+              <a:t> voltage.“</a:t>
             </a:r>
           </a:p>
           <a:p>
@@ -6012,25 +5829,7 @@
               <a:rPr lang="en-CA" sz="1400" dirty="0" smtClean="0">
                 <a:cs typeface="Andalus" pitchFamily="18" charset="-78"/>
               </a:rPr>
-              <a:t> diode </a:t>
-            </a:r>
-            <a:r>
-              <a:rPr lang="en-CA" sz="1400" dirty="0" smtClean="0">
-                <a:cs typeface="Andalus" pitchFamily="18" charset="-78"/>
-              </a:rPr>
-              <a:t>used in reverse bias is ideal </a:t>
-            </a:r>
-            <a:r>
-              <a:rPr lang="en-CA" sz="1400" dirty="0" smtClean="0">
-                <a:cs typeface="Andalus" pitchFamily="18" charset="-78"/>
-              </a:rPr>
-              <a:t>for applications such as the generation of a reference voltage (e.g. for an amplifier stage), or as a voltage stabilizer for low-current applications</a:t>
-            </a:r>
-            <a:r>
-              <a:rPr lang="en-CA" sz="1400" dirty="0" smtClean="0">
-                <a:cs typeface="Andalus" pitchFamily="18" charset="-78"/>
-              </a:rPr>
-              <a:t>. (Poor man’s voltage regulation)</a:t>
+              <a:t> diode used in reverse bias is ideal for applications such as the generation of a reference voltage (e.g. for an amplifier stage), or as a voltage stabilizer for low-current applications. (Poor man’s voltage regulation)</a:t>
             </a:r>
             <a:endParaRPr lang="en-CA" sz="1400" dirty="0">
               <a:cs typeface="Andalus" pitchFamily="18" charset="-78"/>
@@ -6114,11 +5913,7 @@
           <a:p>
             <a:r>
               <a:rPr lang="en-CA" dirty="0" smtClean="0"/>
-              <a:t>**Excerpts taken from: </a:t>
-            </a:r>
-            <a:r>
-              <a:rPr lang="en-CA" dirty="0" smtClean="0"/>
-              <a:t>Wikipedia</a:t>
+              <a:t>**Excerpts taken from: Wikipedia</a:t>
             </a:r>
             <a:endParaRPr lang="en-CA" dirty="0"/>
           </a:p>
@@ -6198,11 +5993,7 @@
             <a:pPr algn="l"/>
             <a:r>
               <a:rPr lang="en-CA" dirty="0" smtClean="0"/>
-              <a:t>2</a:t>
-            </a:r>
-            <a:r>
-              <a:rPr lang="en-CA" dirty="0" smtClean="0"/>
-              <a:t>	 </a:t>
+              <a:t>2	 </a:t>
             </a:r>
             <a:r>
               <a:rPr lang="en-CA" dirty="0" smtClean="0">
@@ -6244,11 +6035,7 @@
             <a:pPr algn="just"/>
             <a:r>
               <a:rPr lang="en-CA" sz="1400" dirty="0" smtClean="0"/>
-              <a:t>A voltage regulator is an electrical regulator designed to automatically maintain a constant voltage level</a:t>
-            </a:r>
-            <a:r>
-              <a:rPr lang="en-CA" sz="1400" dirty="0" smtClean="0"/>
-              <a:t>.</a:t>
+              <a:t>A voltage regulator is an electrical regulator designed to automatically maintain a constant voltage level.</a:t>
             </a:r>
           </a:p>
           <a:p>
@@ -6257,13 +6044,7 @@
               <a:rPr lang="en-CA" sz="1400" dirty="0" smtClean="0">
                 <a:cs typeface="Andalus" pitchFamily="18" charset="-78"/>
               </a:rPr>
-              <a:t>Depending on the design, it may be used to regulate one or more AC or DC voltages</a:t>
-            </a:r>
-            <a:r>
-              <a:rPr lang="en-CA" sz="1400" dirty="0" smtClean="0">
-                <a:cs typeface="Andalus" pitchFamily="18" charset="-78"/>
-              </a:rPr>
-              <a:t>.</a:t>
+              <a:t>Depending on the design, it may be used to regulate one or more AC or DC voltages.</a:t>
             </a:r>
           </a:p>
           <a:p>
@@ -6374,11 +6155,7 @@
           <a:p>
             <a:r>
               <a:rPr lang="en-CA" dirty="0" smtClean="0"/>
-              <a:t>**Excerpts taken from: </a:t>
-            </a:r>
-            <a:r>
-              <a:rPr lang="en-CA" dirty="0" smtClean="0"/>
-              <a:t>Wikipedia</a:t>
+              <a:t>**Excerpts taken from: Wikipedia</a:t>
             </a:r>
             <a:endParaRPr lang="en-CA" dirty="0"/>
           </a:p>
@@ -6482,11 +6259,7 @@
             <a:pPr algn="l"/>
             <a:r>
               <a:rPr lang="en-CA" dirty="0" smtClean="0"/>
-              <a:t>3</a:t>
-            </a:r>
-            <a:r>
-              <a:rPr lang="en-CA" dirty="0" smtClean="0"/>
-              <a:t>	 </a:t>
+              <a:t>3	 </a:t>
             </a:r>
             <a:r>
               <a:rPr lang="en-CA" dirty="0" smtClean="0">
@@ -6740,11 +6513,7 @@
             <a:pPr algn="l"/>
             <a:r>
               <a:rPr lang="en-CA" dirty="0" smtClean="0"/>
-              <a:t>3.1</a:t>
-            </a:r>
-            <a:r>
-              <a:rPr lang="en-CA" dirty="0" smtClean="0"/>
-              <a:t>	 </a:t>
+              <a:t>3.1	 </a:t>
             </a:r>
             <a:r>
               <a:rPr lang="en-CA" dirty="0" smtClean="0">
@@ -7237,11 +7006,7 @@
             <a:pPr algn="l"/>
             <a:r>
               <a:rPr lang="en-CA" dirty="0" smtClean="0"/>
-              <a:t>3.2</a:t>
-            </a:r>
-            <a:r>
-              <a:rPr lang="en-CA" dirty="0" smtClean="0"/>
-              <a:t>	 </a:t>
+              <a:t>3.2	 </a:t>
             </a:r>
             <a:r>
               <a:rPr lang="en-CA" dirty="0" smtClean="0">
@@ -7492,11 +7257,7 @@
             <a:pPr algn="l"/>
             <a:r>
               <a:rPr lang="en-CA" dirty="0" smtClean="0"/>
-              <a:t>3.3</a:t>
-            </a:r>
-            <a:r>
-              <a:rPr lang="en-CA" dirty="0" smtClean="0"/>
-              <a:t>	 </a:t>
+              <a:t>3.3	 </a:t>
             </a:r>
             <a:r>
               <a:rPr lang="en-CA" dirty="0" smtClean="0">
@@ -7738,11 +7499,7 @@
             <a:pPr algn="l"/>
             <a:r>
               <a:rPr lang="en-CA" dirty="0" smtClean="0"/>
-              <a:t>3.4</a:t>
-            </a:r>
-            <a:r>
-              <a:rPr lang="en-CA" dirty="0" smtClean="0"/>
-              <a:t>	 </a:t>
+              <a:t>3.4	 </a:t>
             </a:r>
             <a:r>
               <a:rPr lang="en-CA" dirty="0" smtClean="0">
@@ -8027,11 +7784,7 @@
             <a:pPr algn="l"/>
             <a:r>
               <a:rPr lang="en-CA" dirty="0" smtClean="0"/>
-              <a:t>4</a:t>
-            </a:r>
-            <a:r>
-              <a:rPr lang="en-CA" dirty="0" smtClean="0"/>
-              <a:t>	 </a:t>
+              <a:t>4	 </a:t>
             </a:r>
             <a:r>
               <a:rPr lang="en-CA" dirty="0" smtClean="0">

</xml_diff>

<commit_message>
Made changes to Final Project's description.
</commit_message>
<xml_diff>
--- a/100 - Analog Electronics Fundamentals/Analog Electronics Fundamentals 103.pptx
+++ b/100 - Analog Electronics Fundamentals/Analog Electronics Fundamentals 103.pptx
@@ -3404,7 +3404,18 @@
                   </a:schemeClr>
                 </a:solidFill>
               </a:rPr>
-              <a:t>-Lab5: Bonus: Create Variable power supply 3v ~ 5v with 9v input</a:t>
+              <a:t>-Final Project: </a:t>
+            </a:r>
+            <a:r>
+              <a:rPr lang="en-CA" dirty="0" smtClean="0">
+                <a:solidFill>
+                  <a:schemeClr val="tx1">
+                    <a:lumMod val="75000"/>
+                    <a:lumOff val="25000"/>
+                  </a:schemeClr>
+                </a:solidFill>
+              </a:rPr>
+              <a:t>Create Variable power supply 3v ~ 5v with 9v input</a:t>
             </a:r>
             <a:endParaRPr lang="en-CA" dirty="0">
               <a:solidFill>
@@ -5494,7 +5505,7 @@
         </p:spPr>
         <p:txBody>
           <a:bodyPr>
-            <a:normAutofit/>
+            <a:normAutofit fontScale="90000"/>
           </a:bodyPr>
           <a:lstStyle/>
           <a:p>
@@ -5512,18 +5523,7 @@
                   </a:schemeClr>
                 </a:solidFill>
               </a:rPr>
-              <a:t>Lab5: Variable </a:t>
-            </a:r>
-            <a:r>
-              <a:rPr lang="en-CA" dirty="0" err="1" smtClean="0">
-                <a:solidFill>
-                  <a:schemeClr val="tx1">
-                    <a:lumMod val="75000"/>
-                    <a:lumOff val="25000"/>
-                  </a:schemeClr>
-                </a:solidFill>
-              </a:rPr>
-              <a:t>powersupply</a:t>
+              <a:t>Final Project: </a:t>
             </a:r>
             <a:r>
               <a:rPr lang="en-CA" dirty="0" smtClean="0">
@@ -5534,7 +5534,29 @@
                   </a:schemeClr>
                 </a:solidFill>
               </a:rPr>
-              <a:t> 3v~5v</a:t>
+              <a:t>Variable </a:t>
+            </a:r>
+            <a:r>
+              <a:rPr lang="en-CA" dirty="0" smtClean="0">
+                <a:solidFill>
+                  <a:schemeClr val="tx1">
+                    <a:lumMod val="75000"/>
+                    <a:lumOff val="25000"/>
+                  </a:schemeClr>
+                </a:solidFill>
+              </a:rPr>
+              <a:t>Supply </a:t>
+            </a:r>
+            <a:r>
+              <a:rPr lang="en-CA" dirty="0" smtClean="0">
+                <a:solidFill>
+                  <a:schemeClr val="tx1">
+                    <a:lumMod val="75000"/>
+                    <a:lumOff val="25000"/>
+                  </a:schemeClr>
+                </a:solidFill>
+              </a:rPr>
+              <a:t>3v~5v</a:t>
             </a:r>
             <a:endParaRPr lang="en-CA" u="sng" dirty="0"/>
           </a:p>
@@ -5553,7 +5575,7 @@
         <p:spPr>
           <a:xfrm>
             <a:off x="457200" y="980728"/>
-            <a:ext cx="8229600" cy="2952328"/>
+            <a:ext cx="8229600" cy="4680520"/>
           </a:xfrm>
         </p:spPr>
         <p:txBody>
@@ -5562,40 +5584,243 @@
           </a:bodyPr>
           <a:lstStyle/>
           <a:p>
+            <a:pPr algn="just">
+              <a:buNone/>
+            </a:pPr>
+            <a:r>
+              <a:rPr lang="en-CA" sz="1400" b="1" dirty="0" err="1" smtClean="0">
+                <a:cs typeface="Andalus" pitchFamily="18" charset="-78"/>
+              </a:rPr>
+              <a:t>PreRequisites</a:t>
+            </a:r>
+            <a:r>
+              <a:rPr lang="en-CA" sz="1400" b="1" dirty="0" smtClean="0">
+                <a:cs typeface="Andalus" pitchFamily="18" charset="-78"/>
+              </a:rPr>
+              <a:t>:</a:t>
+            </a:r>
+          </a:p>
+          <a:p>
             <a:pPr algn="just"/>
             <a:r>
+              <a:rPr lang="en-CA" sz="1400" dirty="0" smtClean="0"/>
+              <a:t>Install the free version of </a:t>
+            </a:r>
+            <a:r>
+              <a:rPr lang="en-CA" sz="1400" dirty="0" err="1" smtClean="0"/>
+              <a:t>EagleCAD</a:t>
+            </a:r>
+            <a:r>
+              <a:rPr lang="en-CA" sz="1400" dirty="0" smtClean="0"/>
+              <a:t> (  </a:t>
+            </a:r>
+            <a:r>
               <a:rPr lang="en-CA" sz="1400" dirty="0" smtClean="0">
-                <a:cs typeface="Andalus" pitchFamily="18" charset="-78"/>
-              </a:rPr>
-              <a:t>Use schematic provided with the LM317 </a:t>
-            </a:r>
+                <a:hlinkClick r:id="rId2"/>
+              </a:rPr>
+              <a:t>http://www.cadsoftusa.com/download-eagle/?language=en</a:t>
+            </a:r>
+            <a:r>
+              <a:rPr lang="en-CA" sz="1400" dirty="0" smtClean="0"/>
+              <a:t> </a:t>
+            </a:r>
+            <a:r>
+              <a:rPr lang="en-CA" sz="1400" dirty="0" smtClean="0"/>
+              <a:t>)</a:t>
+            </a:r>
+          </a:p>
+          <a:p>
+            <a:pPr algn="just"/>
+            <a:r>
+              <a:rPr lang="en-CA" sz="1400" dirty="0" smtClean="0"/>
+              <a:t>Try to familiarize yourself with </a:t>
+            </a:r>
+            <a:r>
+              <a:rPr lang="en-CA" sz="1400" dirty="0" err="1" smtClean="0"/>
+              <a:t>EagleCAD</a:t>
+            </a:r>
+            <a:r>
+              <a:rPr lang="en-CA" sz="1400" dirty="0" smtClean="0"/>
+              <a:t> as much as </a:t>
+            </a:r>
+            <a:r>
+              <a:rPr lang="en-CA" sz="1400" dirty="0" smtClean="0"/>
+              <a:t>possible. Some tutorials</a:t>
+            </a:r>
+            <a:r>
+              <a:rPr lang="en-CA" sz="1400" dirty="0" smtClean="0"/>
+              <a:t>: </a:t>
+            </a:r>
+            <a:endParaRPr lang="en-CA" sz="1400" dirty="0" smtClean="0"/>
+          </a:p>
+          <a:p>
+            <a:pPr lvl="1" algn="just"/>
+            <a:r>
+              <a:rPr lang="en-CA" sz="1000" dirty="0" smtClean="0">
+                <a:hlinkClick r:id="rId3"/>
+              </a:rPr>
+              <a:t>https</a:t>
+            </a:r>
+            <a:r>
+              <a:rPr lang="en-CA" sz="1000" dirty="0" smtClean="0">
+                <a:hlinkClick r:id="rId3"/>
+              </a:rPr>
+              <a:t>://</a:t>
+            </a:r>
+            <a:r>
+              <a:rPr lang="en-CA" sz="1000" dirty="0" smtClean="0">
+                <a:hlinkClick r:id="rId3"/>
+              </a:rPr>
+              <a:t>www.sparkfun.com/tutorials/108</a:t>
+            </a:r>
+            <a:endParaRPr lang="en-CA" sz="1000" dirty="0" smtClean="0"/>
+          </a:p>
+          <a:p>
+            <a:pPr lvl="1" algn="just"/>
+            <a:r>
+              <a:rPr lang="en-CA" sz="1000" dirty="0" smtClean="0">
+                <a:hlinkClick r:id="rId4"/>
+              </a:rPr>
+              <a:t>http</a:t>
+            </a:r>
+            <a:r>
+              <a:rPr lang="en-CA" sz="1000" dirty="0" smtClean="0">
+                <a:hlinkClick r:id="rId4"/>
+              </a:rPr>
+              <a:t>://</a:t>
+            </a:r>
+            <a:r>
+              <a:rPr lang="en-CA" sz="1000" dirty="0" smtClean="0">
+                <a:hlinkClick r:id="rId4"/>
+              </a:rPr>
+              <a:t>www.ianstedman.co.uk/Technical/Starting_with_EagleCAD/starting_with_eaglecad.html</a:t>
+            </a:r>
+            <a:endParaRPr lang="en-CA" sz="1000" dirty="0" smtClean="0"/>
+          </a:p>
+          <a:p>
+            <a:pPr algn="just">
+              <a:buNone/>
+            </a:pPr>
+            <a:r>
+              <a:rPr lang="en-CA" sz="1400" b="1" dirty="0" smtClean="0">
+                <a:cs typeface="Andalus" pitchFamily="18" charset="-78"/>
+              </a:rPr>
+              <a:t>Project:</a:t>
+            </a:r>
+          </a:p>
+          <a:p>
+            <a:pPr algn="just"/>
             <a:r>
               <a:rPr lang="en-CA" sz="1400" dirty="0" smtClean="0">
                 <a:cs typeface="Andalus" pitchFamily="18" charset="-78"/>
               </a:rPr>
-              <a:t>datasheet.</a:t>
+              <a:t>Use </a:t>
+            </a:r>
+            <a:r>
+              <a:rPr lang="en-CA" sz="1400" dirty="0" smtClean="0">
+                <a:cs typeface="Andalus" pitchFamily="18" charset="-78"/>
+              </a:rPr>
+              <a:t>schematic provided with the LM317 </a:t>
+            </a:r>
+            <a:r>
+              <a:rPr lang="en-CA" sz="1400" dirty="0" smtClean="0">
+                <a:cs typeface="Andalus" pitchFamily="18" charset="-78"/>
+              </a:rPr>
+              <a:t>datasheet, on the first page. </a:t>
+            </a:r>
+            <a:r>
+              <a:rPr lang="en-CA" sz="1400" dirty="0" smtClean="0"/>
+              <a:t>Feel free to use that as your design, or basis for your design</a:t>
+            </a:r>
+            <a:r>
+              <a:rPr lang="en-CA" sz="1400" dirty="0" smtClean="0"/>
+              <a:t>.</a:t>
+            </a:r>
+          </a:p>
+          <a:p>
+            <a:pPr algn="just"/>
+            <a:r>
+              <a:rPr lang="en-CA" sz="1400" dirty="0" smtClean="0"/>
+              <a:t>You could also add improvements, like adding an LED and switch for ON/OFF</a:t>
+            </a:r>
+            <a:r>
+              <a:rPr lang="en-CA" sz="1400" dirty="0" smtClean="0"/>
+              <a:t>.</a:t>
+            </a:r>
+          </a:p>
+          <a:p>
+            <a:pPr algn="just"/>
+            <a:r>
+              <a:rPr lang="en-CA" sz="1400" dirty="0" smtClean="0"/>
+              <a:t>You will need to prototype your design on a breadboard, and show it's working</a:t>
+            </a:r>
+            <a:r>
+              <a:rPr lang="en-CA" sz="1400" dirty="0" smtClean="0"/>
+              <a:t>.</a:t>
+            </a:r>
+          </a:p>
+          <a:p>
+            <a:pPr algn="just"/>
+            <a:r>
+              <a:rPr lang="en-CA" sz="1400" dirty="0" smtClean="0"/>
+              <a:t>Once you have a working prototype, you can put your design's schematic in </a:t>
+            </a:r>
+            <a:r>
+              <a:rPr lang="en-CA" sz="1400" dirty="0" err="1" smtClean="0"/>
+              <a:t>EagleCAD</a:t>
+            </a:r>
+            <a:r>
+              <a:rPr lang="en-CA" sz="1400" dirty="0" smtClean="0"/>
+              <a:t>, and create a PCB (Printed Circuit Board Layout) for it</a:t>
+            </a:r>
+            <a:r>
+              <a:rPr lang="en-CA" sz="1400" dirty="0" smtClean="0"/>
+              <a:t>.</a:t>
+            </a:r>
+          </a:p>
+          <a:p>
+            <a:pPr algn="just"/>
+            <a:r>
+              <a:rPr lang="en-CA" sz="1400" dirty="0" smtClean="0"/>
+              <a:t>Workshop </a:t>
+            </a:r>
+            <a:r>
+              <a:rPr lang="en-CA" sz="1400" dirty="0" smtClean="0"/>
+              <a:t>105 will be dedicated to </a:t>
+            </a:r>
+            <a:r>
+              <a:rPr lang="en-CA" sz="1400" dirty="0" err="1" smtClean="0"/>
+              <a:t>EagleCAD</a:t>
+            </a:r>
+            <a:r>
+              <a:rPr lang="en-CA" sz="1400" dirty="0" smtClean="0"/>
+              <a:t> circuit and PCB layout making</a:t>
+            </a:r>
+            <a:r>
+              <a:rPr lang="en-CA" sz="1400" dirty="0" smtClean="0"/>
+              <a:t>.</a:t>
+            </a:r>
+          </a:p>
+          <a:p>
+            <a:pPr algn="just"/>
+            <a:r>
+              <a:rPr lang="en-CA" sz="1400" dirty="0" smtClean="0"/>
+              <a:t>During workshop 106, if you have a layout ready, we will go ahead and etch our own PCB, then drill them and populate the components. You will have made your own portable, variable power supply</a:t>
+            </a:r>
+            <a:r>
+              <a:rPr lang="en-CA" sz="1400" dirty="0" smtClean="0"/>
+              <a:t>.</a:t>
+            </a:r>
+          </a:p>
+          <a:p>
+            <a:pPr algn="just"/>
+            <a:r>
+              <a:rPr lang="en-CA" sz="1400" dirty="0" smtClean="0"/>
+              <a:t>If by workshop 106 you don't have a PCB layout ready, I will make some of my proto boards available so that you can still build your designed power supply.</a:t>
             </a:r>
             <a:endParaRPr lang="en-CA" sz="1400" dirty="0" smtClean="0">
               <a:cs typeface="Andalus" pitchFamily="18" charset="-78"/>
             </a:endParaRPr>
-          </a:p>
-          <a:p>
-            <a:pPr algn="just"/>
-            <a:r>
-              <a:rPr lang="en-CA" sz="1400" dirty="0" smtClean="0">
-                <a:cs typeface="Andalus" pitchFamily="18" charset="-78"/>
-              </a:rPr>
-              <a:t>Find a suitable potentiometer, or trim potentiometer in the lab.</a:t>
-            </a:r>
-          </a:p>
-          <a:p>
-            <a:pPr algn="just"/>
-            <a:r>
-              <a:rPr lang="en-CA" sz="1400" dirty="0" smtClean="0">
-                <a:cs typeface="Andalus" pitchFamily="18" charset="-78"/>
-              </a:rPr>
-              <a:t>Build it yourself!</a:t>
-            </a:r>
           </a:p>
           <a:p>
             <a:pPr algn="just"/>
@@ -5608,7 +5833,7 @@
       <p:pic>
         <p:nvPicPr>
           <p:cNvPr id="5" name="Picture 4" descr="by.png">
-            <a:hlinkClick r:id="rId2"/>
+            <a:hlinkClick r:id="rId5"/>
           </p:cNvPr>
           <p:cNvPicPr>
             <a:picLocks noChangeAspect="1"/>
@@ -5616,7 +5841,7 @@
           <p:nvPr/>
         </p:nvPicPr>
         <p:blipFill>
-          <a:blip r:embed="rId3" cstate="print"/>
+          <a:blip r:embed="rId6" cstate="print"/>
           <a:stretch>
             <a:fillRect/>
           </a:stretch>
@@ -5634,7 +5859,7 @@
       <p:pic>
         <p:nvPicPr>
           <p:cNvPr id="6" name="Picture 5" descr="HCLShortLogo.png">
-            <a:hlinkClick r:id="rId4"/>
+            <a:hlinkClick r:id="rId7"/>
           </p:cNvPr>
           <p:cNvPicPr>
             <a:picLocks noChangeAspect="1"/>
@@ -5642,7 +5867,7 @@
           <p:nvPr/>
         </p:nvPicPr>
         <p:blipFill>
-          <a:blip r:embed="rId5" cstate="print"/>
+          <a:blip r:embed="rId8" cstate="print"/>
           <a:stretch>
             <a:fillRect/>
           </a:stretch>

</xml_diff>